<commit_message>
Actualizado el README y las slides
</commit_message>
<xml_diff>
--- a/slides/python_numerico_slides.pptx
+++ b/slides/python_numerico_slides.pptx
@@ -377,7 +377,7 @@
           <a:p>
             <a:fld id="{68B4FE8B-16C8-4AC4-B2E8-25ABD55C296B}" type="datetimeFigureOut">
               <a:rPr lang="es-ES" smtClean="0"/>
-              <a:t>18/02/2020</a:t>
+              <a:t>24/03/2020</a:t>
             </a:fld>
             <a:endParaRPr lang="es-ES"/>
           </a:p>
@@ -2741,7 +2741,19 @@
               <a:rPr lang="es-ES" sz="4000" dirty="0"/>
               <a:t>Python numérico</a:t>
             </a:r>
-            <a:endParaRPr lang="es-ES" sz="4000" b="1" dirty="0"/>
+            <a:br>
+              <a:rPr lang="es-ES" sz="4000" dirty="0"/>
+            </a:br>
+            <a:br>
+              <a:rPr lang="es-ES" sz="4000" dirty="0"/>
+            </a:br>
+            <a:r>
+              <a:rPr lang="es-ES" sz="1000" dirty="0">
+                <a:hlinkClick r:id="rId3"/>
+              </a:rPr>
+              <a:t>https://github.com/jgalgarra/PythonMatematicas</a:t>
+            </a:r>
+            <a:endParaRPr lang="es-ES" sz="1000" b="1" dirty="0"/>
           </a:p>
         </p:txBody>
       </p:sp>
@@ -2792,7 +2804,15 @@
             <a:pPr algn="r"/>
             <a:r>
               <a:rPr lang="es-ES" sz="1800" dirty="0"/>
-              <a:t>2020</a:t>
+              <a:t>Marzo de 2020 (Tempus </a:t>
+            </a:r>
+            <a:r>
+              <a:rPr lang="es-ES" sz="1800" dirty="0" err="1"/>
+              <a:t>pestis</a:t>
+            </a:r>
+            <a:r>
+              <a:rPr lang="es-ES" sz="1800" dirty="0"/>
+              <a:t>)</a:t>
             </a:r>
           </a:p>
         </p:txBody>
@@ -3163,7 +3183,7 @@
                 <a:effectLst/>
                 <a:latin typeface="+mj-lt"/>
                 <a:cs typeface="Times New Roman" panose="02020603050405020304" pitchFamily="18" charset="0"/>
-                <a:hlinkClick r:id="rId3"/>
+                <a:hlinkClick r:id="rId4"/>
               </a:rPr>
               <a:t>Creative</a:t>
             </a:r>
@@ -3178,7 +3198,7 @@
                 <a:effectLst/>
                 <a:latin typeface="+mj-lt"/>
                 <a:cs typeface="Times New Roman" panose="02020603050405020304" pitchFamily="18" charset="0"/>
-                <a:hlinkClick r:id="rId3"/>
+                <a:hlinkClick r:id="rId4"/>
               </a:rPr>
               <a:t> </a:t>
             </a:r>
@@ -3193,7 +3213,7 @@
                 <a:effectLst/>
                 <a:latin typeface="+mj-lt"/>
                 <a:cs typeface="Times New Roman" panose="02020603050405020304" pitchFamily="18" charset="0"/>
-                <a:hlinkClick r:id="rId3"/>
+                <a:hlinkClick r:id="rId4"/>
               </a:rPr>
               <a:t>Commons</a:t>
             </a:r>
@@ -3208,7 +3228,7 @@
                 <a:effectLst/>
                 <a:latin typeface="+mj-lt"/>
                 <a:cs typeface="Times New Roman" panose="02020603050405020304" pitchFamily="18" charset="0"/>
-                <a:hlinkClick r:id="rId3"/>
+                <a:hlinkClick r:id="rId4"/>
               </a:rPr>
               <a:t> Reconocimiento 4.0 Internacional </a:t>
             </a:r>
@@ -3223,7 +3243,7 @@
                 <a:effectLst/>
                 <a:latin typeface="+mj-lt"/>
                 <a:cs typeface="Times New Roman" panose="02020603050405020304" pitchFamily="18" charset="0"/>
-                <a:hlinkClick r:id="rId3"/>
+                <a:hlinkClick r:id="rId4"/>
               </a:rPr>
               <a:t>License</a:t>
             </a:r>
@@ -3278,7 +3298,7 @@
                 <a:effectLst/>
                 <a:latin typeface="+mj-lt"/>
                 <a:cs typeface="Times New Roman" panose="02020603050405020304" pitchFamily="18" charset="0"/>
-                <a:hlinkClick r:id="rId4"/>
+                <a:hlinkClick r:id="rId5"/>
               </a:rPr>
               <a:t>https://github.com/jgalgarra/introprogpython</a:t>
             </a:r>
@@ -3313,7 +3333,7 @@
       <p:pic>
         <p:nvPicPr>
           <p:cNvPr id="10" name="Picture 2" descr="Licencia de Creative Commons">
-            <a:hlinkClick r:id="rId3"/>
+            <a:hlinkClick r:id="rId4"/>
             <a:extLst>
               <a:ext uri="{FF2B5EF4-FFF2-40B4-BE49-F238E27FC236}">
                 <a16:creationId xmlns:a16="http://schemas.microsoft.com/office/drawing/2014/main" id="{B07F3E68-2BCF-4EC0-B981-29542191BC17}"/>
@@ -3326,7 +3346,7 @@
           <p:nvPr/>
         </p:nvPicPr>
         <p:blipFill>
-          <a:blip r:embed="rId5">
+          <a:blip r:embed="rId6">
             <a:extLst>
               <a:ext uri="{28A0092B-C50C-407E-A947-70E740481C1C}">
                 <a14:useLocalDpi xmlns:a14="http://schemas.microsoft.com/office/drawing/2010/main" val="0"/>
@@ -5877,6 +5897,21 @@
 </file>
 
 <file path=customXml/item1.xml><?xml version="1.0" encoding="utf-8"?>
+<?mso-contentType ?>
+<FormTemplates xmlns="http://schemas.microsoft.com/sharepoint/v3/contenttype/forms">
+  <Display>DocumentLibraryForm</Display>
+  <Edit>DocumentLibraryForm</Edit>
+  <New>DocumentLibraryForm</New>
+</FormTemplates>
+</file>
+
+<file path=customXml/item2.xml><?xml version="1.0" encoding="utf-8"?>
+<p:properties xmlns:p="http://schemas.microsoft.com/office/2006/metadata/properties" xmlns:xsi="http://www.w3.org/2001/XMLSchema-instance" xmlns:pc="http://schemas.microsoft.com/office/infopath/2007/PartnerControls">
+  <documentManagement/>
+</p:properties>
+</file>
+
+<file path=customXml/item3.xml><?xml version="1.0" encoding="utf-8"?>
 <ct:contentTypeSchema xmlns:ct="http://schemas.microsoft.com/office/2006/metadata/contentType" xmlns:ma="http://schemas.microsoft.com/office/2006/metadata/properties/metaAttributes" ct:_="" ma:_="" ma:contentTypeName="Documento" ma:contentTypeID="0x010100AE6A9B1AE3C694449E1CBECB26767C28" ma:contentTypeVersion="0" ma:contentTypeDescription="Crear nuevo documento." ma:contentTypeScope="" ma:versionID="f939733f7a29ff16f56243c74c11c85c">
   <xsd:schema xmlns:xsd="http://www.w3.org/2001/XMLSchema" xmlns:xs="http://www.w3.org/2001/XMLSchema" xmlns:p="http://schemas.microsoft.com/office/2006/metadata/properties" targetNamespace="http://schemas.microsoft.com/office/2006/metadata/properties" ma:root="true" ma:fieldsID="ebba8a198e9bb40c3eeca6d0bd41257a">
     <xsd:element name="properties">
@@ -5990,33 +6025,10 @@
 </ct:contentTypeSchema>
 </file>
 
-<file path=customXml/item2.xml><?xml version="1.0" encoding="utf-8"?>
-<p:properties xmlns:p="http://schemas.microsoft.com/office/2006/metadata/properties" xmlns:xsi="http://www.w3.org/2001/XMLSchema-instance" xmlns:pc="http://schemas.microsoft.com/office/infopath/2007/PartnerControls">
-  <documentManagement/>
-</p:properties>
-</file>
-
-<file path=customXml/item3.xml><?xml version="1.0" encoding="utf-8"?>
-<?mso-contentType ?>
-<FormTemplates xmlns="http://schemas.microsoft.com/sharepoint/v3/contenttype/forms">
-  <Display>DocumentLibraryForm</Display>
-  <Edit>DocumentLibraryForm</Edit>
-  <New>DocumentLibraryForm</New>
-</FormTemplates>
-</file>
-
 <file path=customXml/itemProps1.xml><?xml version="1.0" encoding="utf-8"?>
-<ds:datastoreItem xmlns:ds="http://schemas.openxmlformats.org/officeDocument/2006/customXml" ds:itemID="{6FA80CCC-508F-47A8-A8E6-442477940EB7}">
+<ds:datastoreItem xmlns:ds="http://schemas.openxmlformats.org/officeDocument/2006/customXml" ds:itemID="{A9AB788B-E2DA-4E16-B351-E0EC0D46F47D}">
   <ds:schemaRefs>
-    <ds:schemaRef ds:uri="http://schemas.microsoft.com/office/2006/metadata/contentType"/>
-    <ds:schemaRef ds:uri="http://schemas.microsoft.com/office/2006/metadata/properties/metaAttributes"/>
-    <ds:schemaRef ds:uri="http://www.w3.org/2001/XMLSchema"/>
-    <ds:schemaRef ds:uri="http://schemas.microsoft.com/office/2006/metadata/properties"/>
-    <ds:schemaRef ds:uri="http://schemas.openxmlformats.org/package/2006/metadata/core-properties"/>
-    <ds:schemaRef ds:uri="http://purl.org/dc/elements/1.1/"/>
-    <ds:schemaRef ds:uri="http://purl.org/dc/terms/"/>
-    <ds:schemaRef ds:uri="http://schemas.microsoft.com/internal/obd"/>
-    <ds:schemaRef ds:uri="http://schemas.microsoft.com/office/infopath/2007/PartnerControls"/>
+    <ds:schemaRef ds:uri="http://schemas.microsoft.com/sharepoint/v3/contenttype/forms"/>
   </ds:schemaRefs>
 </ds:datastoreItem>
 </file>
@@ -6037,9 +6049,17 @@
 </file>
 
 <file path=customXml/itemProps3.xml><?xml version="1.0" encoding="utf-8"?>
-<ds:datastoreItem xmlns:ds="http://schemas.openxmlformats.org/officeDocument/2006/customXml" ds:itemID="{A9AB788B-E2DA-4E16-B351-E0EC0D46F47D}">
+<ds:datastoreItem xmlns:ds="http://schemas.openxmlformats.org/officeDocument/2006/customXml" ds:itemID="{6FA80CCC-508F-47A8-A8E6-442477940EB7}">
   <ds:schemaRefs>
-    <ds:schemaRef ds:uri="http://schemas.microsoft.com/sharepoint/v3/contenttype/forms"/>
+    <ds:schemaRef ds:uri="http://schemas.microsoft.com/office/2006/metadata/contentType"/>
+    <ds:schemaRef ds:uri="http://schemas.microsoft.com/office/2006/metadata/properties/metaAttributes"/>
+    <ds:schemaRef ds:uri="http://www.w3.org/2001/XMLSchema"/>
+    <ds:schemaRef ds:uri="http://schemas.microsoft.com/office/2006/metadata/properties"/>
+    <ds:schemaRef ds:uri="http://schemas.openxmlformats.org/package/2006/metadata/core-properties"/>
+    <ds:schemaRef ds:uri="http://purl.org/dc/elements/1.1/"/>
+    <ds:schemaRef ds:uri="http://purl.org/dc/terms/"/>
+    <ds:schemaRef ds:uri="http://schemas.microsoft.com/internal/obd"/>
+    <ds:schemaRef ds:uri="http://schemas.microsoft.com/office/infopath/2007/PartnerControls"/>
   </ds:schemaRefs>
 </ds:datastoreItem>
 </file>
</xml_diff>